<commit_message>
consultation midterm and presentation are done
</commit_message>
<xml_diff>
--- a/First_Semester/consultation/BenchmarkAssignment/OLxPBenchPresentation.pptx
+++ b/First_Semester/consultation/BenchmarkAssignment/OLxPBenchPresentation.pptx
@@ -7,12 +7,13 @@
   <p:sldIdLst>
     <p:sldId id="256" r:id="rId2"/>
     <p:sldId id="257" r:id="rId3"/>
-    <p:sldId id="258" r:id="rId4"/>
-    <p:sldId id="259" r:id="rId5"/>
-    <p:sldId id="260" r:id="rId6"/>
-    <p:sldId id="261" r:id="rId7"/>
-    <p:sldId id="262" r:id="rId8"/>
-    <p:sldId id="263" r:id="rId9"/>
+    <p:sldId id="264" r:id="rId4"/>
+    <p:sldId id="258" r:id="rId5"/>
+    <p:sldId id="259" r:id="rId6"/>
+    <p:sldId id="260" r:id="rId7"/>
+    <p:sldId id="261" r:id="rId8"/>
+    <p:sldId id="262" r:id="rId9"/>
+    <p:sldId id="263" r:id="rId10"/>
   </p:sldIdLst>
   <p:sldSz cx="12192000" cy="6858000"/>
   <p:notesSz cx="6858000" cy="9144000"/>
@@ -111,6 +112,11 @@
       </a:defRPr>
     </a:lvl9pPr>
   </p:defaultTextStyle>
+  <p:extLst>
+    <p:ext uri="{EFAFB233-063F-42B5-8137-9DF3F51BA10A}">
+      <p15:sldGuideLst xmlns:p15="http://schemas.microsoft.com/office/powerpoint/2012/main"/>
+    </p:ext>
+  </p:extLst>
 </p:presentation>
 </file>
 
@@ -150,6 +156,7 @@
       <pc:sldMk xmlns:pc="http://schemas.microsoft.com/office/powerpoint/2013/main/command" cId="2158929877" sldId="258"/>
       <ac:spMk id="2" creationId="{272D633B-C633-A37E-7670-684EDF1696B8}"/>
     </ac:deMkLst>
+    <p188:pos x="0" y="0"/>
     <p188:txBody>
       <a:bodyPr/>
       <a:lstStyle/>
@@ -157,6 +164,25 @@
         <a:r>
           <a:rPr lang="en-US"/>
           <a:t>This figure reveals the impact of a hybrid workload – performing a real-time query in-between an online transaction on the performance of TiDB – a state-of-the-art HTAP system against that of only an online transaction. The significant performance gap justifies why we should consider real-time queries in benchmarking HTAP systems. The other two critical factors that the HTAP benchmarks must consider are semantically consistent schema and domain-specific workloads</a:t>
+        </a:r>
+      </a:p>
+    </p188:txBody>
+  </p188:cm>
+  <p188:cm id="{85101408-1AA2-4AEA-BF24-E4F77833EDDF}" authorId="{5CC4605F-59F3-0F49-F45A-795ACEF03AF1}" created="2023-12-25T10:09:31.407">
+    <ac:deMkLst xmlns:ac="http://schemas.microsoft.com/office/drawing/2013/main/command">
+      <pc:docMk xmlns:pc="http://schemas.microsoft.com/office/powerpoint/2013/main/command"/>
+      <pc:sldMk xmlns:pc="http://schemas.microsoft.com/office/powerpoint/2013/main/command" cId="2158929877" sldId="258"/>
+      <ac:spMk id="2" creationId="{272D633B-C633-A37E-7670-684EDF1696B8}"/>
+    </ac:deMkLst>
+    <p188:txBody>
+      <a:bodyPr/>
+      <a:lstStyle/>
+      <a:p>
+        <a:r>
+          <a:rPr lang="en-US"/>
+          <a:t>What is the difference between the throughput and the latency? 
+Throughput -&gt; measures the 
+</a:t>
         </a:r>
       </a:p>
     </p188:txBody>
@@ -3401,7 +3427,7 @@
           <a:p>
             <a:fld id="{7E6F8F9D-67CE-4AE7-8980-E27D89BBC28F}" type="datetimeFigureOut">
               <a:rPr lang="en-US" smtClean="0"/>
-              <a:t>11/26/2023</a:t>
+              <a:t>12/25/2023</a:t>
             </a:fld>
             <a:endParaRPr lang="en-US"/>
           </a:p>
@@ -3612,7 +3638,7 @@
           <a:p>
             <a:fld id="{7E6F8F9D-67CE-4AE7-8980-E27D89BBC28F}" type="datetimeFigureOut">
               <a:rPr lang="en-US" smtClean="0"/>
-              <a:t>11/26/2023</a:t>
+              <a:t>12/25/2023</a:t>
             </a:fld>
             <a:endParaRPr lang="en-US"/>
           </a:p>
@@ -3827,7 +3853,7 @@
           <a:p>
             <a:fld id="{7E6F8F9D-67CE-4AE7-8980-E27D89BBC28F}" type="datetimeFigureOut">
               <a:rPr lang="en-US" smtClean="0"/>
-              <a:t>11/26/2023</a:t>
+              <a:t>12/25/2023</a:t>
             </a:fld>
             <a:endParaRPr lang="en-US"/>
           </a:p>
@@ -4028,7 +4054,7 @@
           <a:p>
             <a:fld id="{7E6F8F9D-67CE-4AE7-8980-E27D89BBC28F}" type="datetimeFigureOut">
               <a:rPr lang="en-US" smtClean="0"/>
-              <a:t>11/26/2023</a:t>
+              <a:t>12/25/2023</a:t>
             </a:fld>
             <a:endParaRPr lang="en-US"/>
           </a:p>
@@ -4307,7 +4333,7 @@
           <a:p>
             <a:fld id="{7E6F8F9D-67CE-4AE7-8980-E27D89BBC28F}" type="datetimeFigureOut">
               <a:rPr lang="en-US" smtClean="0"/>
-              <a:t>11/26/2023</a:t>
+              <a:t>12/25/2023</a:t>
             </a:fld>
             <a:endParaRPr lang="en-US"/>
           </a:p>
@@ -4575,7 +4601,7 @@
           <a:p>
             <a:fld id="{7E6F8F9D-67CE-4AE7-8980-E27D89BBC28F}" type="datetimeFigureOut">
               <a:rPr lang="en-US" smtClean="0"/>
-              <a:t>11/26/2023</a:t>
+              <a:t>12/25/2023</a:t>
             </a:fld>
             <a:endParaRPr lang="en-US"/>
           </a:p>
@@ -4991,7 +5017,7 @@
           <a:p>
             <a:fld id="{7E6F8F9D-67CE-4AE7-8980-E27D89BBC28F}" type="datetimeFigureOut">
               <a:rPr lang="en-US" smtClean="0"/>
-              <a:t>11/26/2023</a:t>
+              <a:t>12/25/2023</a:t>
             </a:fld>
             <a:endParaRPr lang="en-US"/>
           </a:p>
@@ -5140,7 +5166,7 @@
           <a:p>
             <a:fld id="{7E6F8F9D-67CE-4AE7-8980-E27D89BBC28F}" type="datetimeFigureOut">
               <a:rPr lang="en-US" smtClean="0"/>
-              <a:t>11/26/2023</a:t>
+              <a:t>12/25/2023</a:t>
             </a:fld>
             <a:endParaRPr lang="en-US"/>
           </a:p>
@@ -5266,7 +5292,7 @@
           <a:p>
             <a:fld id="{7E6F8F9D-67CE-4AE7-8980-E27D89BBC28F}" type="datetimeFigureOut">
               <a:rPr lang="en-US" smtClean="0"/>
-              <a:t>11/26/2023</a:t>
+              <a:t>12/25/2023</a:t>
             </a:fld>
             <a:endParaRPr lang="en-US"/>
           </a:p>
@@ -5517,7 +5543,7 @@
           <a:p>
             <a:fld id="{7E6F8F9D-67CE-4AE7-8980-E27D89BBC28F}" type="datetimeFigureOut">
               <a:rPr lang="en-US" smtClean="0"/>
-              <a:t>11/26/2023</a:t>
+              <a:t>12/25/2023</a:t>
             </a:fld>
             <a:endParaRPr lang="en-US"/>
           </a:p>
@@ -5962,7 +5988,7 @@
           <a:p>
             <a:fld id="{7E6F8F9D-67CE-4AE7-8980-E27D89BBC28F}" type="datetimeFigureOut">
               <a:rPr lang="en-US" smtClean="0"/>
-              <a:t>11/26/2023</a:t>
+              <a:t>12/25/2023</a:t>
             </a:fld>
             <a:endParaRPr lang="en-US"/>
           </a:p>
@@ -6289,7 +6315,7 @@
           <a:p>
             <a:fld id="{7E6F8F9D-67CE-4AE7-8980-E27D89BBC28F}" type="datetimeFigureOut">
               <a:rPr lang="en-US" smtClean="0"/>
-              <a:t>11/26/2023</a:t>
+              <a:t>12/25/2023</a:t>
             </a:fld>
             <a:endParaRPr lang="en-US"/>
           </a:p>
@@ -6833,12 +6859,12 @@
           <a:lstStyle/>
           <a:p>
             <a:r>
-              <a:rPr lang="en-US" sz="6400" b="1" dirty="0"/>
+              <a:rPr lang="en-US" sz="6400" dirty="0"/>
               <a:t>Real-time, Semantically Consistent, and Domain specific Benchmark, Designing, and Implementing hybrid transactional analytical processing (HTAP) Systems</a:t>
             </a:r>
           </a:p>
           <a:p>
-            <a:endParaRPr lang="en-US" b="1" dirty="0"/>
+            <a:endParaRPr lang="en-US" dirty="0"/>
           </a:p>
           <a:p>
             <a:endParaRPr lang="en-US" b="1" dirty="0"/>
@@ -8789,6 +8815,372 @@
 <file path=ppt/slides/slide3.xml><?xml version="1.0" encoding="utf-8"?>
 <p:sld xmlns:a="http://schemas.openxmlformats.org/drawingml/2006/main" xmlns:r="http://schemas.openxmlformats.org/officeDocument/2006/relationships" xmlns:p="http://schemas.openxmlformats.org/presentationml/2006/main">
   <p:cSld>
+    <p:spTree>
+      <p:nvGrpSpPr>
+        <p:cNvPr id="1" name=""/>
+        <p:cNvGrpSpPr/>
+        <p:nvPr/>
+      </p:nvGrpSpPr>
+      <p:grpSpPr>
+        <a:xfrm>
+          <a:off x="0" y="0"/>
+          <a:ext cx="0" cy="0"/>
+          <a:chOff x="0" y="0"/>
+          <a:chExt cx="0" cy="0"/>
+        </a:xfrm>
+      </p:grpSpPr>
+      <p:sp>
+        <p:nvSpPr>
+          <p:cNvPr id="2" name="Title 1">
+            <a:extLst>
+              <a:ext uri="{FF2B5EF4-FFF2-40B4-BE49-F238E27FC236}">
+                <a16:creationId xmlns:a16="http://schemas.microsoft.com/office/drawing/2014/main" id="{7ED4A626-5658-CD4C-CD31-135D8B3B6D92}"/>
+              </a:ext>
+            </a:extLst>
+          </p:cNvPr>
+          <p:cNvSpPr>
+            <a:spLocks noGrp="1"/>
+          </p:cNvSpPr>
+          <p:nvPr>
+            <p:ph type="title"/>
+          </p:nvPr>
+        </p:nvSpPr>
+        <p:spPr/>
+        <p:txBody>
+          <a:bodyPr/>
+          <a:lstStyle/>
+          <a:p>
+            <a:r>
+              <a:rPr lang="en-US" dirty="0"/>
+              <a:t>Throughput  VS  Latency </a:t>
+            </a:r>
+          </a:p>
+        </p:txBody>
+      </p:sp>
+      <p:sp>
+        <p:nvSpPr>
+          <p:cNvPr id="3" name="Content Placeholder 2">
+            <a:extLst>
+              <a:ext uri="{FF2B5EF4-FFF2-40B4-BE49-F238E27FC236}">
+                <a16:creationId xmlns:a16="http://schemas.microsoft.com/office/drawing/2014/main" id="{8BF8E9DE-7EA2-2C49-5239-B1993E6139FE}"/>
+              </a:ext>
+            </a:extLst>
+          </p:cNvPr>
+          <p:cNvSpPr>
+            <a:spLocks noGrp="1"/>
+          </p:cNvSpPr>
+          <p:nvPr>
+            <p:ph idx="1"/>
+          </p:nvPr>
+        </p:nvSpPr>
+        <p:spPr>
+          <a:xfrm>
+            <a:off x="1451579" y="2015732"/>
+            <a:ext cx="3941303" cy="3450613"/>
+          </a:xfrm>
+        </p:spPr>
+        <p:txBody>
+          <a:bodyPr/>
+          <a:lstStyle/>
+          <a:p>
+            <a:r>
+              <a:rPr lang="en-US" dirty="0"/>
+              <a:t>THROUGHPUT</a:t>
+            </a:r>
+          </a:p>
+          <a:p>
+            <a:pPr lvl="1"/>
+            <a:r>
+              <a:rPr lang="en-US" dirty="0"/>
+              <a:t>Measures the volume of the data that passes through a network in a given period. </a:t>
+            </a:r>
+          </a:p>
+          <a:p>
+            <a:pPr lvl="1"/>
+            <a:r>
+              <a:rPr lang="en-US" dirty="0"/>
+              <a:t>It impacts how much data you can transmit in a period of time.</a:t>
+            </a:r>
+          </a:p>
+        </p:txBody>
+      </p:sp>
+      <p:sp>
+        <p:nvSpPr>
+          <p:cNvPr id="4" name="Content Placeholder 2">
+            <a:extLst>
+              <a:ext uri="{FF2B5EF4-FFF2-40B4-BE49-F238E27FC236}">
+                <a16:creationId xmlns:a16="http://schemas.microsoft.com/office/drawing/2014/main" id="{0D8BD104-E72F-A28A-8EE9-9BD88C15DC97}"/>
+              </a:ext>
+            </a:extLst>
+          </p:cNvPr>
+          <p:cNvSpPr txBox="1">
+            <a:spLocks/>
+          </p:cNvSpPr>
+          <p:nvPr/>
+        </p:nvSpPr>
+        <p:spPr>
+          <a:xfrm>
+            <a:off x="6253216" y="2015731"/>
+            <a:ext cx="3941303" cy="3450613"/>
+          </a:xfrm>
+          <a:prstGeom prst="rect">
+            <a:avLst/>
+          </a:prstGeom>
+        </p:spPr>
+        <p:txBody>
+          <a:bodyPr vert="horz" lIns="91440" tIns="45720" rIns="91440" bIns="45720" rtlCol="0" anchor="t">
+            <a:normAutofit/>
+          </a:bodyPr>
+          <a:lstStyle>
+            <a:lvl1pPr marL="228600" indent="-228600" algn="l" defTabSz="914400" rtl="0" eaLnBrk="1" latinLnBrk="0" hangingPunct="1">
+              <a:lnSpc>
+                <a:spcPct val="120000"/>
+              </a:lnSpc>
+              <a:spcBef>
+                <a:spcPts val="1000"/>
+              </a:spcBef>
+              <a:buClr>
+                <a:schemeClr val="accent1"/>
+              </a:buClr>
+              <a:buSzPct val="100000"/>
+              <a:buFont typeface="Arial" panose="020B0604020202020204" pitchFamily="34" charset="0"/>
+              <a:buChar char="•"/>
+              <a:defRPr sz="2000" kern="1200">
+                <a:solidFill>
+                  <a:schemeClr val="tx1"/>
+                </a:solidFill>
+                <a:effectLst/>
+                <a:latin typeface="+mn-lt"/>
+                <a:ea typeface="+mn-ea"/>
+                <a:cs typeface="+mn-cs"/>
+              </a:defRPr>
+            </a:lvl1pPr>
+            <a:lvl2pPr marL="685800" indent="-228600" algn="l" defTabSz="914400" rtl="0" eaLnBrk="1" latinLnBrk="0" hangingPunct="1">
+              <a:lnSpc>
+                <a:spcPct val="120000"/>
+              </a:lnSpc>
+              <a:spcBef>
+                <a:spcPts val="500"/>
+              </a:spcBef>
+              <a:buClr>
+                <a:schemeClr val="accent1"/>
+              </a:buClr>
+              <a:buSzPct val="100000"/>
+              <a:buFont typeface="Arial" panose="020B0604020202020204" pitchFamily="34" charset="0"/>
+              <a:buChar char="•"/>
+              <a:defRPr sz="1800" kern="1200" cap="none" baseline="0">
+                <a:solidFill>
+                  <a:schemeClr val="tx1"/>
+                </a:solidFill>
+                <a:effectLst/>
+                <a:latin typeface="+mn-lt"/>
+                <a:ea typeface="+mn-ea"/>
+                <a:cs typeface="+mn-cs"/>
+              </a:defRPr>
+            </a:lvl2pPr>
+            <a:lvl3pPr marL="1143000" indent="-228600" algn="l" defTabSz="914400" rtl="0" eaLnBrk="1" latinLnBrk="0" hangingPunct="1">
+              <a:lnSpc>
+                <a:spcPct val="120000"/>
+              </a:lnSpc>
+              <a:spcBef>
+                <a:spcPts val="500"/>
+              </a:spcBef>
+              <a:buClr>
+                <a:schemeClr val="accent1"/>
+              </a:buClr>
+              <a:buSzPct val="100000"/>
+              <a:buFont typeface="Arial" panose="020B0604020202020204" pitchFamily="34" charset="0"/>
+              <a:buChar char="•"/>
+              <a:defRPr sz="1600" kern="1200">
+                <a:solidFill>
+                  <a:schemeClr val="tx1"/>
+                </a:solidFill>
+                <a:effectLst/>
+                <a:latin typeface="+mn-lt"/>
+                <a:ea typeface="+mn-ea"/>
+                <a:cs typeface="+mn-cs"/>
+              </a:defRPr>
+            </a:lvl3pPr>
+            <a:lvl4pPr marL="1600200" indent="-228600" algn="l" defTabSz="914400" rtl="0" eaLnBrk="1" latinLnBrk="0" hangingPunct="1">
+              <a:lnSpc>
+                <a:spcPct val="120000"/>
+              </a:lnSpc>
+              <a:spcBef>
+                <a:spcPts val="500"/>
+              </a:spcBef>
+              <a:buClr>
+                <a:schemeClr val="accent1"/>
+              </a:buClr>
+              <a:buSzPct val="100000"/>
+              <a:buFont typeface="Arial" panose="020B0604020202020204" pitchFamily="34" charset="0"/>
+              <a:buChar char="•"/>
+              <a:defRPr sz="1400" kern="1200" cap="none" baseline="0">
+                <a:solidFill>
+                  <a:schemeClr val="tx1"/>
+                </a:solidFill>
+                <a:effectLst/>
+                <a:latin typeface="+mn-lt"/>
+                <a:ea typeface="+mn-ea"/>
+                <a:cs typeface="+mn-cs"/>
+              </a:defRPr>
+            </a:lvl4pPr>
+            <a:lvl5pPr marL="2057400" indent="-228600" algn="l" defTabSz="914400" rtl="0" eaLnBrk="1" latinLnBrk="0" hangingPunct="1">
+              <a:lnSpc>
+                <a:spcPct val="120000"/>
+              </a:lnSpc>
+              <a:spcBef>
+                <a:spcPts val="500"/>
+              </a:spcBef>
+              <a:buClr>
+                <a:schemeClr val="accent1"/>
+              </a:buClr>
+              <a:buSzPct val="100000"/>
+              <a:buFont typeface="Arial" panose="020B0604020202020204" pitchFamily="34" charset="0"/>
+              <a:buChar char="•"/>
+              <a:defRPr sz="1200" kern="1200">
+                <a:solidFill>
+                  <a:schemeClr val="tx1"/>
+                </a:solidFill>
+                <a:effectLst/>
+                <a:latin typeface="+mn-lt"/>
+                <a:ea typeface="+mn-ea"/>
+                <a:cs typeface="+mn-cs"/>
+              </a:defRPr>
+            </a:lvl5pPr>
+            <a:lvl6pPr marL="2514600" indent="-228600" algn="l" defTabSz="914400" rtl="0" eaLnBrk="1" latinLnBrk="0" hangingPunct="1">
+              <a:lnSpc>
+                <a:spcPct val="120000"/>
+              </a:lnSpc>
+              <a:spcBef>
+                <a:spcPts val="500"/>
+              </a:spcBef>
+              <a:buClr>
+                <a:schemeClr val="accent1"/>
+              </a:buClr>
+              <a:buSzPct val="100000"/>
+              <a:buFont typeface="Arial" panose="020B0604020202020204" pitchFamily="34" charset="0"/>
+              <a:buChar char="•"/>
+              <a:defRPr sz="1200" kern="1200">
+                <a:solidFill>
+                  <a:schemeClr val="tx1"/>
+                </a:solidFill>
+                <a:effectLst/>
+                <a:latin typeface="+mn-lt"/>
+                <a:ea typeface="+mn-ea"/>
+                <a:cs typeface="+mn-cs"/>
+              </a:defRPr>
+            </a:lvl6pPr>
+            <a:lvl7pPr marL="2971800" indent="-228600" algn="l" defTabSz="914400" rtl="0" eaLnBrk="1" latinLnBrk="0" hangingPunct="1">
+              <a:lnSpc>
+                <a:spcPct val="120000"/>
+              </a:lnSpc>
+              <a:spcBef>
+                <a:spcPts val="500"/>
+              </a:spcBef>
+              <a:buClr>
+                <a:schemeClr val="accent1"/>
+              </a:buClr>
+              <a:buSzPct val="100000"/>
+              <a:buFont typeface="Arial" panose="020B0604020202020204" pitchFamily="34" charset="0"/>
+              <a:buChar char="•"/>
+              <a:defRPr sz="1200" kern="1200">
+                <a:solidFill>
+                  <a:schemeClr val="tx1"/>
+                </a:solidFill>
+                <a:effectLst/>
+                <a:latin typeface="+mn-lt"/>
+                <a:ea typeface="+mn-ea"/>
+                <a:cs typeface="+mn-cs"/>
+              </a:defRPr>
+            </a:lvl7pPr>
+            <a:lvl8pPr marL="3429000" indent="-228600" algn="l" defTabSz="914400" rtl="0" eaLnBrk="1" latinLnBrk="0" hangingPunct="1">
+              <a:lnSpc>
+                <a:spcPct val="120000"/>
+              </a:lnSpc>
+              <a:spcBef>
+                <a:spcPts val="500"/>
+              </a:spcBef>
+              <a:buClr>
+                <a:schemeClr val="accent1"/>
+              </a:buClr>
+              <a:buSzPct val="100000"/>
+              <a:buFont typeface="Arial" panose="020B0604020202020204" pitchFamily="34" charset="0"/>
+              <a:buChar char="•"/>
+              <a:defRPr sz="1200" kern="1200" baseline="0">
+                <a:solidFill>
+                  <a:schemeClr val="tx1"/>
+                </a:solidFill>
+                <a:effectLst/>
+                <a:latin typeface="+mn-lt"/>
+                <a:ea typeface="+mn-ea"/>
+                <a:cs typeface="+mn-cs"/>
+              </a:defRPr>
+            </a:lvl8pPr>
+            <a:lvl9pPr marL="3886200" indent="-228600" algn="l" defTabSz="914400" rtl="0" eaLnBrk="1" latinLnBrk="0" hangingPunct="1">
+              <a:lnSpc>
+                <a:spcPct val="120000"/>
+              </a:lnSpc>
+              <a:spcBef>
+                <a:spcPts val="500"/>
+              </a:spcBef>
+              <a:buClr>
+                <a:schemeClr val="accent1"/>
+              </a:buClr>
+              <a:buSzPct val="100000"/>
+              <a:buFont typeface="Arial" panose="020B0604020202020204" pitchFamily="34" charset="0"/>
+              <a:buChar char="•"/>
+              <a:defRPr sz="1200" kern="1200" baseline="0">
+                <a:solidFill>
+                  <a:schemeClr val="tx1"/>
+                </a:solidFill>
+                <a:effectLst/>
+                <a:latin typeface="+mn-lt"/>
+                <a:ea typeface="+mn-ea"/>
+                <a:cs typeface="+mn-cs"/>
+              </a:defRPr>
+            </a:lvl9pPr>
+          </a:lstStyle>
+          <a:p>
+            <a:r>
+              <a:rPr lang="en-US" dirty="0"/>
+              <a:t>LATENCY</a:t>
+            </a:r>
+          </a:p>
+          <a:p>
+            <a:pPr lvl="1"/>
+            <a:r>
+              <a:rPr lang="en-US" dirty="0"/>
+              <a:t>Measures the time delay when sending data. </a:t>
+            </a:r>
+          </a:p>
+          <a:p>
+            <a:pPr lvl="1"/>
+            <a:r>
+              <a:rPr lang="en-US" dirty="0"/>
+              <a:t>A higher latency causes a network delay.</a:t>
+            </a:r>
+          </a:p>
+          <a:p>
+            <a:endParaRPr lang="en-US" dirty="0"/>
+          </a:p>
+        </p:txBody>
+      </p:sp>
+    </p:spTree>
+    <p:extLst>
+      <p:ext uri="{BB962C8B-B14F-4D97-AF65-F5344CB8AC3E}">
+        <p14:creationId xmlns:p14="http://schemas.microsoft.com/office/powerpoint/2010/main" val="3567301654"/>
+      </p:ext>
+    </p:extLst>
+  </p:cSld>
+  <p:clrMapOvr>
+    <a:masterClrMapping/>
+  </p:clrMapOvr>
+</p:sld>
+</file>
+
+<file path=ppt/slides/slide4.xml><?xml version="1.0" encoding="utf-8"?>
+<p:sld xmlns:a="http://schemas.openxmlformats.org/drawingml/2006/main" xmlns:r="http://schemas.openxmlformats.org/officeDocument/2006/relationships" xmlns:p="http://schemas.openxmlformats.org/presentationml/2006/main">
+  <p:cSld>
     <p:bg>
       <p:bgPr>
         <a:gradFill rotWithShape="1">
@@ -9589,6 +9981,59 @@
           </a:fontRef>
         </p:style>
       </p:cxnSp>
+      <p:sp>
+        <p:nvSpPr>
+          <p:cNvPr id="4" name="TextBox 3">
+            <a:extLst>
+              <a:ext uri="{FF2B5EF4-FFF2-40B4-BE49-F238E27FC236}">
+                <a16:creationId xmlns:a16="http://schemas.microsoft.com/office/drawing/2014/main" id="{A2D593E3-BE6F-E241-627F-200467BAB048}"/>
+              </a:ext>
+            </a:extLst>
+          </p:cNvPr>
+          <p:cNvSpPr txBox="1"/>
+          <p:nvPr/>
+        </p:nvSpPr>
+        <p:spPr>
+          <a:xfrm>
+            <a:off x="266862" y="3766387"/>
+            <a:ext cx="3618012" cy="1815882"/>
+          </a:xfrm>
+          <a:prstGeom prst="rect">
+            <a:avLst/>
+          </a:prstGeom>
+          <a:noFill/>
+        </p:spPr>
+        <p:txBody>
+          <a:bodyPr wrap="square" rtlCol="0">
+            <a:spAutoFit/>
+          </a:bodyPr>
+          <a:lstStyle/>
+          <a:p>
+            <a:r>
+              <a:rPr lang="en-US" sz="1600" dirty="0">
+                <a:effectLst/>
+                <a:latin typeface="Segoe UI" panose="020B0502040204020203" pitchFamily="34" charset="0"/>
+              </a:rPr>
+              <a:t>This figure reveals the impact of a hybrid workload – performing a real-time query in-between an online transaction on the performance of </a:t>
+            </a:r>
+            <a:r>
+              <a:rPr lang="en-US" sz="1600" dirty="0" err="1">
+                <a:effectLst/>
+                <a:latin typeface="Segoe UI" panose="020B0502040204020203" pitchFamily="34" charset="0"/>
+              </a:rPr>
+              <a:t>TiDB</a:t>
+            </a:r>
+            <a:r>
+              <a:rPr lang="en-US" sz="1600" dirty="0">
+                <a:effectLst/>
+                <a:latin typeface="Segoe UI" panose="020B0502040204020203" pitchFamily="34" charset="0"/>
+              </a:rPr>
+              <a:t> – a state-of-the-art HTAP system against that of only an online transaction. </a:t>
+            </a:r>
+            <a:endParaRPr lang="en-US" sz="1600" dirty="0"/>
+          </a:p>
+        </p:txBody>
+      </p:sp>
     </p:spTree>
     <p:extLst>
       <p:ext uri="{BB962C8B-B14F-4D97-AF65-F5344CB8AC3E}">
@@ -9607,7 +10052,7 @@
 </p:sld>
 </file>
 
-<file path=ppt/slides/slide4.xml><?xml version="1.0" encoding="utf-8"?>
+<file path=ppt/slides/slide5.xml><?xml version="1.0" encoding="utf-8"?>
 <p:sld xmlns:a="http://schemas.openxmlformats.org/drawingml/2006/main" xmlns:r="http://schemas.openxmlformats.org/officeDocument/2006/relationships" xmlns:p="http://schemas.openxmlformats.org/presentationml/2006/main">
   <p:cSld>
     <p:bg>
@@ -10086,7 +10531,7 @@
 </p:sld>
 </file>
 
-<file path=ppt/slides/slide5.xml><?xml version="1.0" encoding="utf-8"?>
+<file path=ppt/slides/slide6.xml><?xml version="1.0" encoding="utf-8"?>
 <p:sld xmlns:a="http://schemas.openxmlformats.org/drawingml/2006/main" xmlns:r="http://schemas.openxmlformats.org/officeDocument/2006/relationships" xmlns:p="http://schemas.openxmlformats.org/presentationml/2006/main">
   <p:cSld>
     <p:bg>
@@ -11008,7 +11453,7 @@
 </p:sld>
 </file>
 
-<file path=ppt/slides/slide6.xml><?xml version="1.0" encoding="utf-8"?>
+<file path=ppt/slides/slide7.xml><?xml version="1.0" encoding="utf-8"?>
 <p:sld xmlns:a="http://schemas.openxmlformats.org/drawingml/2006/main" xmlns:r="http://schemas.openxmlformats.org/officeDocument/2006/relationships" xmlns:p="http://schemas.openxmlformats.org/presentationml/2006/main">
   <p:cSld>
     <p:bg>
@@ -11824,7 +12269,7 @@
 </p:sld>
 </file>
 
-<file path=ppt/slides/slide7.xml><?xml version="1.0" encoding="utf-8"?>
+<file path=ppt/slides/slide8.xml><?xml version="1.0" encoding="utf-8"?>
 <p:sld xmlns:a="http://schemas.openxmlformats.org/drawingml/2006/main" xmlns:r="http://schemas.openxmlformats.org/officeDocument/2006/relationships" xmlns:p="http://schemas.openxmlformats.org/presentationml/2006/main">
   <p:cSld>
     <p:bg>
@@ -12550,7 +12995,7 @@
 </p:sld>
 </file>
 
-<file path=ppt/slides/slide8.xml><?xml version="1.0" encoding="utf-8"?>
+<file path=ppt/slides/slide9.xml><?xml version="1.0" encoding="utf-8"?>
 <p:sld xmlns:a="http://schemas.openxmlformats.org/drawingml/2006/main" xmlns:r="http://schemas.openxmlformats.org/officeDocument/2006/relationships" xmlns:p="http://schemas.openxmlformats.org/presentationml/2006/main">
   <p:cSld>
     <p:bg>

</xml_diff>